<commit_message>
tambah comment, perbaiki ppt
</commit_message>
<xml_diff>
--- a/Dokumen/ppt+kp.pptx
+++ b/Dokumen/ppt+kp.pptx
@@ -7,9 +7,10 @@
   <p:sldIdLst>
     <p:sldId id="256" r:id="rId2"/>
     <p:sldId id="260" r:id="rId3"/>
-    <p:sldId id="257" r:id="rId4"/>
+    <p:sldId id="261" r:id="rId4"/>
     <p:sldId id="258" r:id="rId5"/>
-    <p:sldId id="259" r:id="rId6"/>
+    <p:sldId id="262" r:id="rId6"/>
+    <p:sldId id="259" r:id="rId7"/>
   </p:sldIdLst>
   <p:sldSz cx="12192000" cy="6858000"/>
   <p:notesSz cx="6858000" cy="9144000"/>
@@ -3901,7 +3902,7 @@
           <p:cNvPr id="2" name="Title 1">
             <a:extLst>
               <a:ext uri="{FF2B5EF4-FFF2-40B4-BE49-F238E27FC236}">
-                <a16:creationId xmlns:a16="http://schemas.microsoft.com/office/drawing/2014/main" id="{40780BC7-DCD1-461F-8618-44F7D7887626}"/>
+                <a16:creationId xmlns:a16="http://schemas.microsoft.com/office/drawing/2014/main" id="{6A7CBCDB-5C28-4F40-90EC-CADB7BEB2CD3}"/>
               </a:ext>
             </a:extLst>
           </p:cNvPr>
@@ -3929,7 +3930,7 @@
           <p:cNvPr id="3" name="Content Placeholder 2">
             <a:extLst>
               <a:ext uri="{FF2B5EF4-FFF2-40B4-BE49-F238E27FC236}">
-                <a16:creationId xmlns:a16="http://schemas.microsoft.com/office/drawing/2014/main" id="{FA76952B-2E78-412D-994A-C1919491184A}"/>
+                <a16:creationId xmlns:a16="http://schemas.microsoft.com/office/drawing/2014/main" id="{79F52DDD-3D28-4C8B-B899-A3D82D604CB9}"/>
               </a:ext>
             </a:extLst>
           </p:cNvPr>
@@ -3946,12 +3947,146 @@
           <a:lstStyle/>
           <a:p>
             <a:r>
+              <a:rPr lang="en-US" dirty="0" err="1"/>
+              <a:t>Sistem</a:t>
+            </a:r>
+            <a:r>
+              <a:rPr lang="en-US" dirty="0"/>
+              <a:t> Swift </a:t>
+            </a:r>
+            <a:r>
+              <a:rPr lang="en-US" dirty="0" err="1"/>
+              <a:t>dinilai</a:t>
+            </a:r>
+            <a:r>
+              <a:rPr lang="en-US" dirty="0"/>
+              <a:t> </a:t>
+            </a:r>
+            <a:r>
+              <a:rPr lang="en-US" dirty="0" err="1"/>
+              <a:t>kurang</a:t>
+            </a:r>
+            <a:r>
+              <a:rPr lang="en-US" dirty="0"/>
+              <a:t> </a:t>
+            </a:r>
+            <a:r>
+              <a:rPr lang="en-US" dirty="0" err="1"/>
+              <a:t>memuaskan</a:t>
+            </a:r>
+            <a:r>
+              <a:rPr lang="en-US" dirty="0"/>
+              <a:t> </a:t>
+            </a:r>
+            <a:r>
+              <a:rPr lang="en-US" dirty="0" err="1"/>
+              <a:t>karena</a:t>
+            </a:r>
+            <a:endParaRPr lang="en-US" dirty="0"/>
+          </a:p>
+          <a:p>
+            <a:pPr lvl="1"/>
+            <a:r>
+              <a:rPr lang="en-US" dirty="0" err="1"/>
+              <a:t>Waktu</a:t>
+            </a:r>
+            <a:r>
+              <a:rPr lang="en-US" dirty="0"/>
+              <a:t> yang </a:t>
+            </a:r>
+            <a:r>
+              <a:rPr lang="en-US" dirty="0" err="1"/>
+              <a:t>dibutuhkan</a:t>
+            </a:r>
+            <a:r>
+              <a:rPr lang="en-US" dirty="0"/>
+              <a:t> lama</a:t>
+            </a:r>
+          </a:p>
+          <a:p>
+            <a:pPr lvl="1"/>
+            <a:r>
+              <a:rPr lang="en-US" dirty="0" err="1"/>
+              <a:t>Adanya</a:t>
+            </a:r>
+            <a:r>
+              <a:rPr lang="en-US" dirty="0"/>
+              <a:t> </a:t>
+            </a:r>
+            <a:r>
+              <a:rPr lang="en-US" dirty="0" err="1"/>
+              <a:t>kemungkinan</a:t>
+            </a:r>
+            <a:r>
+              <a:rPr lang="en-US" dirty="0"/>
+              <a:t> human error </a:t>
+            </a:r>
+            <a:r>
+              <a:rPr lang="en-US" dirty="0" err="1"/>
+              <a:t>saat</a:t>
+            </a:r>
+            <a:r>
+              <a:rPr lang="en-US" dirty="0"/>
+              <a:t> input</a:t>
+            </a:r>
+          </a:p>
+          <a:p>
+            <a:pPr lvl="1"/>
+            <a:r>
               <a:rPr lang="en-US" dirty="0"/>
               <a:t>Data yang </a:t>
             </a:r>
             <a:r>
               <a:rPr lang="en-US" dirty="0" err="1"/>
-              <a:t>dimiliki</a:t>
+              <a:t>diberikan</a:t>
+            </a:r>
+            <a:r>
+              <a:rPr lang="en-US" dirty="0"/>
+              <a:t> </a:t>
+            </a:r>
+            <a:r>
+              <a:rPr lang="en-US" dirty="0" err="1"/>
+              <a:t>adalah</a:t>
+            </a:r>
+            <a:r>
+              <a:rPr lang="en-US" dirty="0"/>
+              <a:t> data yang </a:t>
+            </a:r>
+            <a:r>
+              <a:rPr lang="en-US" dirty="0" err="1"/>
+              <a:t>masih</a:t>
+            </a:r>
+            <a:r>
+              <a:rPr lang="en-US" dirty="0"/>
+              <a:t> </a:t>
+            </a:r>
+            <a:r>
+              <a:rPr lang="en-US" dirty="0" err="1"/>
+              <a:t>perlu</a:t>
+            </a:r>
+            <a:r>
+              <a:rPr lang="en-US" dirty="0"/>
+              <a:t> </a:t>
+            </a:r>
+            <a:r>
+              <a:rPr lang="en-US" dirty="0" err="1"/>
+              <a:t>diolah</a:t>
+            </a:r>
+            <a:r>
+              <a:rPr lang="en-US" dirty="0"/>
+              <a:t> </a:t>
+            </a:r>
+            <a:r>
+              <a:rPr lang="en-US" dirty="0" err="1"/>
+              <a:t>sebelum</a:t>
+            </a:r>
+            <a:r>
+              <a:rPr lang="en-US" dirty="0"/>
+              <a:t> </a:t>
+            </a:r>
+            <a:r>
+              <a:rPr lang="en-US" dirty="0" err="1"/>
+              <a:t>diterima</a:t>
             </a:r>
             <a:r>
               <a:rPr lang="en-US" dirty="0"/>
@@ -3963,19 +4098,17 @@
             </a:r>
             <a:r>
               <a:rPr lang="en-US" dirty="0"/>
-              <a:t> Aircraft reliability management </a:t>
-            </a:r>
-            <a:r>
-              <a:rPr lang="en-US" dirty="0" err="1"/>
-              <a:t>dibutuhkan</a:t>
-            </a:r>
-            <a:r>
-              <a:rPr lang="en-US" dirty="0"/>
-              <a:t> </a:t>
-            </a:r>
-            <a:r>
-              <a:rPr lang="en-US" dirty="0" err="1"/>
-              <a:t>oleh</a:t>
+              <a:t> user</a:t>
+            </a:r>
+          </a:p>
+          <a:p>
+            <a:r>
+              <a:rPr lang="en-US" dirty="0"/>
+              <a:t>Aircraft reliability management </a:t>
+            </a:r>
+            <a:r>
+              <a:rPr lang="en-US" dirty="0" err="1"/>
+              <a:t>merupakan</a:t>
             </a:r>
             <a:r>
               <a:rPr lang="en-US" dirty="0"/>
@@ -3987,190 +4120,121 @@
             </a:r>
             <a:r>
               <a:rPr lang="en-US" dirty="0"/>
-              <a:t> </a:t>
-            </a:r>
-            <a:r>
-              <a:rPr lang="en-US" dirty="0" err="1"/>
-              <a:t>lainnya</a:t>
+              <a:t> engineering yang </a:t>
+            </a:r>
+            <a:r>
+              <a:rPr lang="en-US" dirty="0" err="1"/>
+              <a:t>verifikasi</a:t>
+            </a:r>
+            <a:r>
+              <a:rPr lang="en-US" dirty="0"/>
+              <a:t> data swift daily </a:t>
+            </a:r>
+            <a:r>
+              <a:rPr lang="en-US" dirty="0" err="1"/>
+              <a:t>dan</a:t>
+            </a:r>
+            <a:r>
+              <a:rPr lang="en-US" dirty="0"/>
+              <a:t> monthly</a:t>
+            </a:r>
+          </a:p>
+          <a:p>
+            <a:r>
+              <a:rPr lang="en-US" dirty="0" err="1"/>
+              <a:t>Dinas</a:t>
+            </a:r>
+            <a:r>
+              <a:rPr lang="en-US" dirty="0"/>
+              <a:t> lain yang </a:t>
+            </a:r>
+            <a:r>
+              <a:rPr lang="en-US" dirty="0" err="1"/>
+              <a:t>memeerlukan</a:t>
+            </a:r>
+            <a:r>
+              <a:rPr lang="en-US" dirty="0"/>
+              <a:t> data yang </a:t>
+            </a:r>
+            <a:r>
+              <a:rPr lang="en-US" dirty="0" err="1"/>
+              <a:t>telah</a:t>
+            </a:r>
+            <a:r>
+              <a:rPr lang="en-US" dirty="0"/>
+              <a:t> </a:t>
+            </a:r>
+            <a:r>
+              <a:rPr lang="en-US" dirty="0" err="1"/>
+              <a:t>diverifikasi</a:t>
+            </a:r>
+            <a:r>
+              <a:rPr lang="en-US" dirty="0"/>
+              <a:t> </a:t>
+            </a:r>
+            <a:r>
+              <a:rPr lang="en-US" dirty="0" err="1"/>
+              <a:t>dan</a:t>
+            </a:r>
+            <a:r>
+              <a:rPr lang="en-US" dirty="0"/>
+              <a:t> </a:t>
+            </a:r>
+            <a:r>
+              <a:rPr lang="en-US" dirty="0" err="1"/>
+              <a:t>diolah</a:t>
+            </a:r>
+            <a:r>
+              <a:rPr lang="en-US" dirty="0"/>
+              <a:t> </a:t>
+            </a:r>
+            <a:r>
+              <a:rPr lang="en-US" dirty="0" err="1"/>
+              <a:t>harus</a:t>
+            </a:r>
+            <a:r>
+              <a:rPr lang="en-US" dirty="0"/>
+              <a:t> </a:t>
+            </a:r>
+            <a:r>
+              <a:rPr lang="en-US" dirty="0" err="1"/>
+              <a:t>meminta</a:t>
+            </a:r>
+            <a:r>
+              <a:rPr lang="en-US" dirty="0"/>
+              <a:t> </a:t>
+            </a:r>
+            <a:r>
+              <a:rPr lang="en-US" dirty="0" err="1"/>
+              <a:t>ke</a:t>
+            </a:r>
+            <a:r>
+              <a:rPr lang="en-US" dirty="0"/>
+              <a:t> </a:t>
+            </a:r>
+            <a:r>
+              <a:rPr lang="en-US" dirty="0" err="1"/>
+              <a:t>dinas</a:t>
+            </a:r>
+            <a:r>
+              <a:rPr lang="en-US" dirty="0"/>
+              <a:t> Aircraft Reliability </a:t>
+            </a:r>
+            <a:r>
+              <a:rPr lang="en-US" dirty="0" err="1"/>
+              <a:t>terlebih</a:t>
+            </a:r>
+            <a:r>
+              <a:rPr lang="en-US" dirty="0"/>
+              <a:t> </a:t>
+            </a:r>
+            <a:r>
+              <a:rPr lang="en-US" dirty="0" err="1"/>
+              <a:t>dahulu</a:t>
             </a:r>
             <a:endParaRPr lang="en-US" dirty="0"/>
           </a:p>
           <a:p>
-            <a:r>
-              <a:rPr lang="en-US" dirty="0"/>
-              <a:t>Data </a:t>
-            </a:r>
-            <a:r>
-              <a:rPr lang="en-US" dirty="0" err="1"/>
-              <a:t>tersimpan</a:t>
-            </a:r>
-            <a:r>
-              <a:rPr lang="en-US" dirty="0"/>
-              <a:t> </a:t>
-            </a:r>
-            <a:r>
-              <a:rPr lang="en-US" dirty="0" err="1"/>
-              <a:t>dengan</a:t>
-            </a:r>
-            <a:r>
-              <a:rPr lang="en-US" dirty="0"/>
-              <a:t> </a:t>
-            </a:r>
-            <a:r>
-              <a:rPr lang="en-US" dirty="0" err="1"/>
-              <a:t>baik</a:t>
-            </a:r>
-            <a:r>
-              <a:rPr lang="en-US" dirty="0"/>
-              <a:t> </a:t>
-            </a:r>
-            <a:r>
-              <a:rPr lang="en-US" dirty="0" err="1"/>
-              <a:t>namun</a:t>
-            </a:r>
-            <a:r>
-              <a:rPr lang="en-US" dirty="0"/>
-              <a:t> </a:t>
-            </a:r>
-            <a:r>
-              <a:rPr lang="en-US" dirty="0" err="1"/>
-              <a:t>apabila</a:t>
-            </a:r>
-            <a:r>
-              <a:rPr lang="en-US" dirty="0"/>
-              <a:t> </a:t>
-            </a:r>
-            <a:r>
-              <a:rPr lang="en-US" dirty="0" err="1"/>
-              <a:t>dinas</a:t>
-            </a:r>
-            <a:r>
-              <a:rPr lang="en-US" dirty="0"/>
-              <a:t> lain </a:t>
-            </a:r>
-            <a:r>
-              <a:rPr lang="en-US" dirty="0" err="1"/>
-              <a:t>memerlukan</a:t>
-            </a:r>
-            <a:r>
-              <a:rPr lang="en-US" dirty="0"/>
-              <a:t> data </a:t>
-            </a:r>
-            <a:r>
-              <a:rPr lang="en-US" dirty="0" err="1"/>
-              <a:t>spesifik</a:t>
-            </a:r>
-            <a:r>
-              <a:rPr lang="en-US" dirty="0"/>
-              <a:t> </a:t>
-            </a:r>
-            <a:r>
-              <a:rPr lang="en-US" dirty="0" err="1"/>
-              <a:t>dari</a:t>
-            </a:r>
-            <a:r>
-              <a:rPr lang="en-US" dirty="0"/>
-              <a:t> Aircraft Reliability Management, </a:t>
-            </a:r>
-            <a:r>
-              <a:rPr lang="en-US" dirty="0" err="1"/>
-              <a:t>mereka</a:t>
-            </a:r>
-            <a:r>
-              <a:rPr lang="en-US" dirty="0"/>
-              <a:t> </a:t>
-            </a:r>
-            <a:r>
-              <a:rPr lang="en-US" dirty="0" err="1"/>
-              <a:t>harus</a:t>
-            </a:r>
-            <a:r>
-              <a:rPr lang="en-US" dirty="0"/>
-              <a:t> </a:t>
-            </a:r>
-            <a:r>
-              <a:rPr lang="en-US" dirty="0" err="1"/>
-              <a:t>menunggu</a:t>
-            </a:r>
-            <a:r>
-              <a:rPr lang="en-US" dirty="0"/>
-              <a:t> </a:t>
-            </a:r>
-            <a:r>
-              <a:rPr lang="en-US" dirty="0" err="1"/>
-              <a:t>hingga</a:t>
-            </a:r>
-            <a:r>
-              <a:rPr lang="en-US" dirty="0"/>
-              <a:t> data </a:t>
-            </a:r>
-            <a:r>
-              <a:rPr lang="en-US" dirty="0" err="1"/>
-              <a:t>tersebut</a:t>
-            </a:r>
-            <a:r>
-              <a:rPr lang="en-US" dirty="0"/>
-              <a:t> </a:t>
-            </a:r>
-            <a:r>
-              <a:rPr lang="en-US" dirty="0" err="1"/>
-              <a:t>siap</a:t>
-            </a:r>
-            <a:r>
-              <a:rPr lang="en-US" dirty="0"/>
-              <a:t> </a:t>
-            </a:r>
-            <a:r>
-              <a:rPr lang="en-US" dirty="0" err="1"/>
-              <a:t>diolah</a:t>
-            </a:r>
-            <a:endParaRPr lang="en-US" dirty="0"/>
-          </a:p>
-          <a:p>
-            <a:r>
-              <a:rPr lang="en-US" dirty="0" err="1"/>
-              <a:t>Belum</a:t>
-            </a:r>
-            <a:r>
-              <a:rPr lang="en-US" dirty="0"/>
-              <a:t> </a:t>
-            </a:r>
-            <a:r>
-              <a:rPr lang="en-US" dirty="0" err="1"/>
-              <a:t>adanya</a:t>
-            </a:r>
-            <a:r>
-              <a:rPr lang="en-US" dirty="0"/>
-              <a:t> media yang </a:t>
-            </a:r>
-            <a:r>
-              <a:rPr lang="en-US" dirty="0" err="1"/>
-              <a:t>dapat</a:t>
-            </a:r>
-            <a:r>
-              <a:rPr lang="en-US" dirty="0"/>
-              <a:t> </a:t>
-            </a:r>
-            <a:r>
-              <a:rPr lang="en-US" dirty="0" err="1"/>
-              <a:t>menampilkan</a:t>
-            </a:r>
-            <a:r>
-              <a:rPr lang="en-US" dirty="0"/>
-              <a:t> data Aircraft Reliability Management </a:t>
-            </a:r>
-            <a:r>
-              <a:rPr lang="en-US" dirty="0" err="1"/>
-              <a:t>secara</a:t>
-            </a:r>
-            <a:r>
-              <a:rPr lang="en-US" dirty="0"/>
-              <a:t> </a:t>
-            </a:r>
-            <a:r>
-              <a:rPr lang="en-US" dirty="0" err="1"/>
-              <a:t>otomatis</a:t>
-            </a:r>
             <a:endParaRPr lang="en-US" dirty="0"/>
           </a:p>
         </p:txBody>
@@ -4178,7 +4242,7 @@
     </p:spTree>
     <p:extLst>
       <p:ext uri="{BB962C8B-B14F-4D97-AF65-F5344CB8AC3E}">
-        <p14:creationId xmlns:p14="http://schemas.microsoft.com/office/powerpoint/2010/main" val="3222153140"/>
+        <p14:creationId xmlns:p14="http://schemas.microsoft.com/office/powerpoint/2010/main" val="3197244088"/>
       </p:ext>
     </p:extLst>
   </p:cSld>
@@ -4626,6 +4690,182 @@
           <p:cNvPr id="2" name="Title 1">
             <a:extLst>
               <a:ext uri="{FF2B5EF4-FFF2-40B4-BE49-F238E27FC236}">
+                <a16:creationId xmlns:a16="http://schemas.microsoft.com/office/drawing/2014/main" id="{E9FE63E1-B6C9-4613-B771-D92F7AD8E8D1}"/>
+              </a:ext>
+            </a:extLst>
+          </p:cNvPr>
+          <p:cNvSpPr>
+            <a:spLocks noGrp="1"/>
+          </p:cNvSpPr>
+          <p:nvPr>
+            <p:ph type="title"/>
+          </p:nvPr>
+        </p:nvSpPr>
+        <p:spPr/>
+        <p:txBody>
+          <a:bodyPr/>
+          <a:lstStyle/>
+          <a:p>
+            <a:r>
+              <a:rPr lang="en-US" dirty="0" err="1"/>
+              <a:t>Fungsi</a:t>
+            </a:r>
+            <a:r>
+              <a:rPr lang="en-US" dirty="0"/>
+              <a:t> Software</a:t>
+            </a:r>
+          </a:p>
+        </p:txBody>
+      </p:sp>
+      <p:sp>
+        <p:nvSpPr>
+          <p:cNvPr id="3" name="Content Placeholder 2">
+            <a:extLst>
+              <a:ext uri="{FF2B5EF4-FFF2-40B4-BE49-F238E27FC236}">
+                <a16:creationId xmlns:a16="http://schemas.microsoft.com/office/drawing/2014/main" id="{672855F1-AB38-458F-8785-09DD3BACDBA6}"/>
+              </a:ext>
+            </a:extLst>
+          </p:cNvPr>
+          <p:cNvSpPr>
+            <a:spLocks noGrp="1"/>
+          </p:cNvSpPr>
+          <p:nvPr>
+            <p:ph idx="1"/>
+          </p:nvPr>
+        </p:nvSpPr>
+        <p:spPr/>
+        <p:txBody>
+          <a:bodyPr/>
+          <a:lstStyle/>
+          <a:p>
+            <a:r>
+              <a:rPr lang="en-US" dirty="0" err="1"/>
+              <a:t>Menampilkan</a:t>
+            </a:r>
+            <a:r>
+              <a:rPr lang="en-US" dirty="0"/>
+              <a:t> </a:t>
+            </a:r>
+            <a:r>
+              <a:rPr lang="en-US" dirty="0" err="1"/>
+              <a:t>grafik</a:t>
+            </a:r>
+            <a:r>
+              <a:rPr lang="en-US" dirty="0"/>
+              <a:t> </a:t>
+            </a:r>
+            <a:r>
+              <a:rPr lang="en-US" dirty="0" err="1"/>
+              <a:t>dan</a:t>
+            </a:r>
+            <a:r>
+              <a:rPr lang="en-US" dirty="0"/>
+              <a:t> </a:t>
+            </a:r>
+            <a:r>
+              <a:rPr lang="en-US" dirty="0" err="1"/>
+              <a:t>tabel</a:t>
+            </a:r>
+            <a:endParaRPr lang="en-US" dirty="0"/>
+          </a:p>
+          <a:p>
+            <a:pPr lvl="1"/>
+            <a:r>
+              <a:rPr lang="en-US" dirty="0" err="1"/>
+              <a:t>Techlog</a:t>
+            </a:r>
+            <a:r>
+              <a:rPr lang="en-US" dirty="0"/>
+              <a:t> / Delay</a:t>
+            </a:r>
+          </a:p>
+          <a:p>
+            <a:pPr lvl="1"/>
+            <a:r>
+              <a:rPr lang="en-US" dirty="0"/>
+              <a:t>Pareto </a:t>
+            </a:r>
+            <a:r>
+              <a:rPr lang="en-US" dirty="0" err="1"/>
+              <a:t>Techlog</a:t>
+            </a:r>
+            <a:r>
+              <a:rPr lang="en-US" dirty="0"/>
+              <a:t> / Delay</a:t>
+            </a:r>
+          </a:p>
+          <a:p>
+            <a:pPr lvl="1"/>
+            <a:r>
+              <a:rPr lang="en-US" dirty="0"/>
+              <a:t>Component Removal</a:t>
+            </a:r>
+          </a:p>
+          <a:p>
+            <a:pPr lvl="1"/>
+            <a:r>
+              <a:rPr lang="en-US" dirty="0"/>
+              <a:t>Pareto Component Removal</a:t>
+            </a:r>
+          </a:p>
+          <a:p>
+            <a:pPr lvl="1"/>
+            <a:r>
+              <a:rPr lang="en-US" dirty="0"/>
+              <a:t>MTBUR</a:t>
+            </a:r>
+          </a:p>
+          <a:p>
+            <a:pPr lvl="1"/>
+            <a:r>
+              <a:rPr lang="en-US" dirty="0"/>
+              <a:t>Oil Consumption</a:t>
+            </a:r>
+          </a:p>
+          <a:p>
+            <a:pPr lvl="1"/>
+            <a:r>
+              <a:rPr lang="en-US" dirty="0"/>
+              <a:t>PFR Online</a:t>
+            </a:r>
+          </a:p>
+        </p:txBody>
+      </p:sp>
+    </p:spTree>
+    <p:extLst>
+      <p:ext uri="{BB962C8B-B14F-4D97-AF65-F5344CB8AC3E}">
+        <p14:creationId xmlns:p14="http://schemas.microsoft.com/office/powerpoint/2010/main" val="3754433087"/>
+      </p:ext>
+    </p:extLst>
+  </p:cSld>
+  <p:clrMapOvr>
+    <a:masterClrMapping/>
+  </p:clrMapOvr>
+</p:sld>
+</file>
+
+<file path=ppt/slides/slide6.xml><?xml version="1.0" encoding="utf-8"?>
+<p:sld xmlns:a="http://schemas.openxmlformats.org/drawingml/2006/main" xmlns:r="http://schemas.openxmlformats.org/officeDocument/2006/relationships" xmlns:p="http://schemas.openxmlformats.org/presentationml/2006/main">
+  <p:cSld>
+    <p:spTree>
+      <p:nvGrpSpPr>
+        <p:cNvPr id="1" name=""/>
+        <p:cNvGrpSpPr/>
+        <p:nvPr/>
+      </p:nvGrpSpPr>
+      <p:grpSpPr>
+        <a:xfrm>
+          <a:off x="0" y="0"/>
+          <a:ext cx="0" cy="0"/>
+          <a:chOff x="0" y="0"/>
+          <a:chExt cx="0" cy="0"/>
+        </a:xfrm>
+      </p:grpSpPr>
+      <p:sp>
+        <p:nvSpPr>
+          <p:cNvPr id="2" name="Title 1">
+            <a:extLst>
+              <a:ext uri="{FF2B5EF4-FFF2-40B4-BE49-F238E27FC236}">
                 <a16:creationId xmlns:a16="http://schemas.microsoft.com/office/drawing/2014/main" id="{4710834F-5E7B-4242-B3E9-E38AD9CF77D2}"/>
               </a:ext>
             </a:extLst>
@@ -4642,7 +4882,14 @@
           <a:bodyPr/>
           <a:lstStyle/>
           <a:p>
-            <a:endParaRPr lang="en-US"/>
+            <a:r>
+              <a:rPr lang="en-US" dirty="0" err="1"/>
+              <a:t>Pengenalan</a:t>
+            </a:r>
+            <a:r>
+              <a:rPr lang="en-US" dirty="0"/>
+              <a:t> software</a:t>
+            </a:r>
           </a:p>
         </p:txBody>
       </p:sp>
@@ -4667,7 +4914,52 @@
           <a:bodyPr/>
           <a:lstStyle/>
           <a:p>
-            <a:endParaRPr lang="en-US"/>
+            <a:r>
+              <a:rPr lang="en-US" dirty="0"/>
+              <a:t>Basic</a:t>
+            </a:r>
+          </a:p>
+          <a:p>
+            <a:pPr lvl="1"/>
+            <a:r>
+              <a:rPr lang="en-US" dirty="0"/>
+              <a:t>PHP</a:t>
+            </a:r>
+          </a:p>
+          <a:p>
+            <a:pPr lvl="1"/>
+            <a:r>
+              <a:rPr lang="en-US" dirty="0"/>
+              <a:t>HTML 5</a:t>
+            </a:r>
+          </a:p>
+          <a:p>
+            <a:r>
+              <a:rPr lang="en-US" dirty="0"/>
+              <a:t>Plug-in</a:t>
+            </a:r>
+          </a:p>
+          <a:p>
+            <a:pPr lvl="1"/>
+            <a:r>
+              <a:rPr lang="en-US" dirty="0" err="1"/>
+              <a:t>Datatables</a:t>
+            </a:r>
+            <a:endParaRPr lang="en-US" dirty="0"/>
+          </a:p>
+          <a:p>
+            <a:pPr lvl="1"/>
+            <a:r>
+              <a:rPr lang="en-US" dirty="0"/>
+              <a:t>JSPDF</a:t>
+            </a:r>
+          </a:p>
+          <a:p>
+            <a:pPr lvl="1"/>
+            <a:r>
+              <a:rPr lang="en-US" dirty="0"/>
+              <a:t>Chart JS</a:t>
+            </a:r>
           </a:p>
         </p:txBody>
       </p:sp>

</xml_diff>

<commit_message>
comment terbaru + foto buat ppt
</commit_message>
<xml_diff>
--- a/Dokumen/ppt+kp.pptx
+++ b/Dokumen/ppt+kp.pptx
@@ -268,7 +268,7 @@
           <a:p>
             <a:fld id="{36600E21-78BD-46EE-AA37-5F263998EC97}" type="datetimeFigureOut">
               <a:rPr lang="en-US" smtClean="0"/>
-              <a:t>7/31/2017</a:t>
+              <a:t>8/1/2017</a:t>
             </a:fld>
             <a:endParaRPr lang="en-US"/>
           </a:p>
@@ -466,7 +466,7 @@
           <a:p>
             <a:fld id="{36600E21-78BD-46EE-AA37-5F263998EC97}" type="datetimeFigureOut">
               <a:rPr lang="en-US" smtClean="0"/>
-              <a:t>7/31/2017</a:t>
+              <a:t>8/1/2017</a:t>
             </a:fld>
             <a:endParaRPr lang="en-US"/>
           </a:p>
@@ -674,7 +674,7 @@
           <a:p>
             <a:fld id="{36600E21-78BD-46EE-AA37-5F263998EC97}" type="datetimeFigureOut">
               <a:rPr lang="en-US" smtClean="0"/>
-              <a:t>7/31/2017</a:t>
+              <a:t>8/1/2017</a:t>
             </a:fld>
             <a:endParaRPr lang="en-US"/>
           </a:p>
@@ -872,7 +872,7 @@
           <a:p>
             <a:fld id="{36600E21-78BD-46EE-AA37-5F263998EC97}" type="datetimeFigureOut">
               <a:rPr lang="en-US" smtClean="0"/>
-              <a:t>7/31/2017</a:t>
+              <a:t>8/1/2017</a:t>
             </a:fld>
             <a:endParaRPr lang="en-US"/>
           </a:p>
@@ -1147,7 +1147,7 @@
           <a:p>
             <a:fld id="{36600E21-78BD-46EE-AA37-5F263998EC97}" type="datetimeFigureOut">
               <a:rPr lang="en-US" smtClean="0"/>
-              <a:t>7/31/2017</a:t>
+              <a:t>8/1/2017</a:t>
             </a:fld>
             <a:endParaRPr lang="en-US"/>
           </a:p>
@@ -1412,7 +1412,7 @@
           <a:p>
             <a:fld id="{36600E21-78BD-46EE-AA37-5F263998EC97}" type="datetimeFigureOut">
               <a:rPr lang="en-US" smtClean="0"/>
-              <a:t>7/31/2017</a:t>
+              <a:t>8/1/2017</a:t>
             </a:fld>
             <a:endParaRPr lang="en-US"/>
           </a:p>
@@ -1824,7 +1824,7 @@
           <a:p>
             <a:fld id="{36600E21-78BD-46EE-AA37-5F263998EC97}" type="datetimeFigureOut">
               <a:rPr lang="en-US" smtClean="0"/>
-              <a:t>7/31/2017</a:t>
+              <a:t>8/1/2017</a:t>
             </a:fld>
             <a:endParaRPr lang="en-US"/>
           </a:p>
@@ -1965,7 +1965,7 @@
           <a:p>
             <a:fld id="{36600E21-78BD-46EE-AA37-5F263998EC97}" type="datetimeFigureOut">
               <a:rPr lang="en-US" smtClean="0"/>
-              <a:t>7/31/2017</a:t>
+              <a:t>8/1/2017</a:t>
             </a:fld>
             <a:endParaRPr lang="en-US"/>
           </a:p>
@@ -2078,7 +2078,7 @@
           <a:p>
             <a:fld id="{36600E21-78BD-46EE-AA37-5F263998EC97}" type="datetimeFigureOut">
               <a:rPr lang="en-US" smtClean="0"/>
-              <a:t>7/31/2017</a:t>
+              <a:t>8/1/2017</a:t>
             </a:fld>
             <a:endParaRPr lang="en-US"/>
           </a:p>
@@ -2389,7 +2389,7 @@
           <a:p>
             <a:fld id="{36600E21-78BD-46EE-AA37-5F263998EC97}" type="datetimeFigureOut">
               <a:rPr lang="en-US" smtClean="0"/>
-              <a:t>7/31/2017</a:t>
+              <a:t>8/1/2017</a:t>
             </a:fld>
             <a:endParaRPr lang="en-US"/>
           </a:p>
@@ -2677,7 +2677,7 @@
           <a:p>
             <a:fld id="{36600E21-78BD-46EE-AA37-5F263998EC97}" type="datetimeFigureOut">
               <a:rPr lang="en-US" smtClean="0"/>
-              <a:t>7/31/2017</a:t>
+              <a:t>8/1/2017</a:t>
             </a:fld>
             <a:endParaRPr lang="en-US"/>
           </a:p>
@@ -2918,7 +2918,7 @@
           <a:p>
             <a:fld id="{36600E21-78BD-46EE-AA37-5F263998EC97}" type="datetimeFigureOut">
               <a:rPr lang="en-US" smtClean="0"/>
-              <a:t>7/31/2017</a:t>
+              <a:t>8/1/2017</a:t>
             </a:fld>
             <a:endParaRPr lang="en-US"/>
           </a:p>
@@ -3660,36 +3660,41 @@
           </a:p>
         </p:txBody>
       </p:sp>
-      <p:sp>
-        <p:nvSpPr>
-          <p:cNvPr id="6" name="Content Placeholder 5">
-            <a:extLst>
-              <a:ext uri="{FF2B5EF4-FFF2-40B4-BE49-F238E27FC236}">
-                <a16:creationId xmlns:a16="http://schemas.microsoft.com/office/drawing/2014/main" id="{C800CDF0-EFA0-49C9-AED5-0B89D073DC5A}"/>
-              </a:ext>
-            </a:extLst>
-          </p:cNvPr>
-          <p:cNvSpPr>
-            <a:spLocks noGrp="1"/>
-          </p:cNvSpPr>
+      <p:pic>
+        <p:nvPicPr>
+          <p:cNvPr id="3" name="Content Placeholder 2">
+            <a:extLst>
+              <a:ext uri="{FF2B5EF4-FFF2-40B4-BE49-F238E27FC236}">
+                <a16:creationId xmlns:a16="http://schemas.microsoft.com/office/drawing/2014/main" id="{FE6C05B4-BBFB-44DE-B2E4-2ECD3476AC47}"/>
+              </a:ext>
+            </a:extLst>
+          </p:cNvPr>
+          <p:cNvPicPr>
+            <a:picLocks noGrp="1" noChangeAspect="1"/>
+          </p:cNvPicPr>
           <p:nvPr>
             <p:ph sz="half" idx="2"/>
           </p:nvPr>
-        </p:nvSpPr>
+        </p:nvPicPr>
+        <p:blipFill>
+          <a:blip r:embed="rId2">
+            <a:extLst>
+              <a:ext uri="{28A0092B-C50C-407E-A947-70E740481C1C}">
+                <a14:useLocalDpi xmlns:a14="http://schemas.microsoft.com/office/drawing/2010/main" val="0"/>
+              </a:ext>
+            </a:extLst>
+          </a:blip>
+          <a:stretch>
+            <a:fillRect/>
+          </a:stretch>
+        </p:blipFill>
         <p:spPr>
           <a:xfrm>
-            <a:off x="839788" y="1479464"/>
-            <a:ext cx="5157787" cy="2548839"/>
+            <a:off x="2165749" y="1479464"/>
+            <a:ext cx="1912824" cy="2548839"/>
           </a:xfrm>
         </p:spPr>
-        <p:txBody>
-          <a:bodyPr/>
-          <a:lstStyle/>
-          <a:p>
-            <a:endParaRPr lang="en-US" dirty="0"/>
-          </a:p>
-        </p:txBody>
-      </p:sp>
+      </p:pic>
       <p:sp>
         <p:nvSpPr>
           <p:cNvPr id="7" name="Text Placeholder 6">

</xml_diff>

<commit_message>
penambahan laporan_kp dan ppt kp
</commit_message>
<xml_diff>
--- a/Dokumen/ppt+kp.pptx
+++ b/Dokumen/ppt+kp.pptx
@@ -3957,7 +3957,7 @@
             </a:r>
             <a:r>
               <a:rPr lang="en-US" dirty="0"/>
-              <a:t> Swift </a:t>
+              <a:t> SWIFT </a:t>
             </a:r>
             <a:r>
               <a:rPr lang="en-US" dirty="0" err="1"/>
@@ -3997,6 +3997,14 @@
             </a:r>
             <a:r>
               <a:rPr lang="en-US" dirty="0"/>
+              <a:t> </a:t>
+            </a:r>
+            <a:r>
+              <a:rPr lang="en-US" dirty="0" err="1"/>
+              <a:t>akses</a:t>
+            </a:r>
+            <a:r>
+              <a:rPr lang="en-US" dirty="0"/>
               <a:t> yang </a:t>
             </a:r>
             <a:r>
@@ -4011,51 +4019,16 @@
           <a:p>
             <a:pPr lvl="1"/>
             <a:r>
-              <a:rPr lang="en-US" dirty="0" err="1"/>
-              <a:t>Adanya</a:t>
-            </a:r>
-            <a:r>
-              <a:rPr lang="en-US" dirty="0"/>
-              <a:t> </a:t>
-            </a:r>
-            <a:r>
-              <a:rPr lang="en-US" dirty="0" err="1"/>
-              <a:t>kemungkinan</a:t>
-            </a:r>
-            <a:r>
-              <a:rPr lang="en-US" dirty="0"/>
-              <a:t> human error </a:t>
-            </a:r>
-            <a:r>
-              <a:rPr lang="en-US" dirty="0" err="1"/>
-              <a:t>saat</a:t>
-            </a:r>
-            <a:r>
-              <a:rPr lang="en-US" dirty="0"/>
-              <a:t> input</a:t>
-            </a:r>
-          </a:p>
-          <a:p>
-            <a:pPr lvl="1"/>
-            <a:r>
-              <a:rPr lang="en-US" dirty="0"/>
-              <a:t>Data yang </a:t>
-            </a:r>
-            <a:r>
-              <a:rPr lang="en-US" dirty="0" err="1"/>
-              <a:t>diberikan</a:t>
-            </a:r>
-            <a:r>
-              <a:rPr lang="en-US" dirty="0"/>
-              <a:t> </a:t>
-            </a:r>
-            <a:r>
-              <a:rPr lang="en-US" dirty="0" err="1"/>
-              <a:t>adalah</a:t>
-            </a:r>
-            <a:r>
-              <a:rPr lang="en-US" dirty="0"/>
-              <a:t> data yang </a:t>
+              <a:rPr lang="en-US" dirty="0"/>
+              <a:t>Data </a:t>
+            </a:r>
+            <a:r>
+              <a:rPr lang="en-US" dirty="0" err="1"/>
+              <a:t>dalam</a:t>
+            </a:r>
+            <a:r>
+              <a:rPr lang="en-US" dirty="0"/>
+              <a:t> system SWIFT </a:t>
             </a:r>
             <a:r>
               <a:rPr lang="en-US" dirty="0" err="1"/>
@@ -4075,41 +4048,18 @@
             </a:r>
             <a:r>
               <a:rPr lang="en-US" dirty="0" err="1"/>
-              <a:t>diolah</a:t>
-            </a:r>
-            <a:r>
-              <a:rPr lang="en-US" dirty="0"/>
-              <a:t> </a:t>
-            </a:r>
-            <a:r>
-              <a:rPr lang="en-US" dirty="0" err="1"/>
-              <a:t>sebelum</a:t>
-            </a:r>
-            <a:r>
-              <a:rPr lang="en-US" dirty="0"/>
-              <a:t> </a:t>
-            </a:r>
-            <a:r>
-              <a:rPr lang="en-US" dirty="0" err="1"/>
-              <a:t>diterima</a:t>
-            </a:r>
-            <a:r>
-              <a:rPr lang="en-US" dirty="0"/>
-              <a:t> </a:t>
-            </a:r>
-            <a:r>
-              <a:rPr lang="en-US" dirty="0" err="1"/>
-              <a:t>oleh</a:t>
-            </a:r>
-            <a:r>
-              <a:rPr lang="en-US" dirty="0"/>
-              <a:t> user</a:t>
-            </a:r>
-          </a:p>
-          <a:p>
-            <a:r>
-              <a:rPr lang="en-US" dirty="0"/>
-              <a:t>Aircraft reliability management </a:t>
+              <a:t>diverifikasi</a:t>
+            </a:r>
+            <a:endParaRPr lang="en-US" dirty="0"/>
+          </a:p>
+          <a:p>
+            <a:r>
+              <a:rPr lang="en-US" dirty="0" err="1"/>
+              <a:t>Reliabiliy</a:t>
+            </a:r>
+            <a:r>
+              <a:rPr lang="en-US" dirty="0"/>
+              <a:t> management </a:t>
             </a:r>
             <a:r>
               <a:rPr lang="en-US" dirty="0" err="1"/>
@@ -4129,19 +4079,35 @@
             </a:r>
             <a:r>
               <a:rPr lang="en-US" dirty="0" err="1"/>
-              <a:t>verifikasi</a:t>
-            </a:r>
-            <a:r>
-              <a:rPr lang="en-US" dirty="0"/>
-              <a:t> data swift daily </a:t>
-            </a:r>
-            <a:r>
-              <a:rPr lang="en-US" dirty="0" err="1"/>
-              <a:t>dan</a:t>
-            </a:r>
-            <a:r>
-              <a:rPr lang="en-US" dirty="0"/>
-              <a:t> monthly</a:t>
+              <a:t>memverifikasi</a:t>
+            </a:r>
+            <a:r>
+              <a:rPr lang="en-US" dirty="0"/>
+              <a:t> data SWIFT </a:t>
+            </a:r>
+            <a:r>
+              <a:rPr lang="en-US" dirty="0" err="1"/>
+              <a:t>berkaitan</a:t>
+            </a:r>
+            <a:r>
+              <a:rPr lang="en-US" dirty="0"/>
+              <a:t> </a:t>
+            </a:r>
+            <a:r>
+              <a:rPr lang="en-US" dirty="0" err="1"/>
+              <a:t>dengan</a:t>
+            </a:r>
+            <a:r>
+              <a:rPr lang="en-US" dirty="0"/>
+              <a:t> Reliability (</a:t>
+            </a:r>
+            <a:r>
+              <a:rPr lang="en-US" dirty="0" err="1"/>
+              <a:t>Techlog</a:t>
+            </a:r>
+            <a:r>
+              <a:rPr lang="en-US" dirty="0"/>
+              <a:t>, Delay, Component Removal)</a:t>
             </a:r>
           </a:p>
           <a:p>
@@ -4155,7 +4121,7 @@
             </a:r>
             <a:r>
               <a:rPr lang="en-US" dirty="0" err="1"/>
-              <a:t>memeerlukan</a:t>
+              <a:t>memerlukan</a:t>
             </a:r>
             <a:r>
               <a:rPr lang="en-US" dirty="0"/>
@@ -4824,15 +4790,24 @@
             <a:pPr lvl="1"/>
             <a:r>
               <a:rPr lang="en-US" dirty="0"/>
-              <a:t>Oil Consumption</a:t>
+              <a:t>Oil Consumption </a:t>
+            </a:r>
+            <a:r>
+              <a:rPr lang="en-US" i="1" dirty="0"/>
+              <a:t>(Existing System)</a:t>
             </a:r>
           </a:p>
           <a:p>
             <a:pPr lvl="1"/>
             <a:r>
               <a:rPr lang="en-US" dirty="0"/>
-              <a:t>PFR Online</a:t>
-            </a:r>
+              <a:t>PFR Online </a:t>
+            </a:r>
+            <a:r>
+              <a:rPr lang="en-US" i="1" dirty="0"/>
+              <a:t>(Existing System)</a:t>
+            </a:r>
+            <a:endParaRPr lang="en-US" dirty="0"/>
           </a:p>
         </p:txBody>
       </p:sp>

</xml_diff>